<commit_message>
Updated existing rules to Eclipse Phase 2.0 (2018.11 preview).
</commit_message>
<xml_diff>
--- a/cheat-sheet/supplement/figure-layout.pptx
+++ b/cheat-sheet/supplement/figure-layout.pptx
@@ -5,11 +5,13 @@
     <p:sldMasterId id="2147483648" r:id="rId1"/>
   </p:sldMasterIdLst>
   <p:notesMasterIdLst>
-    <p:notesMasterId r:id="rId4"/>
+    <p:notesMasterId r:id="rId6"/>
   </p:notesMasterIdLst>
   <p:sldIdLst>
     <p:sldId id="257" r:id="rId2"/>
     <p:sldId id="258" r:id="rId3"/>
+    <p:sldId id="259" r:id="rId4"/>
+    <p:sldId id="260" r:id="rId5"/>
   </p:sldIdLst>
   <p:sldSz cx="12192000" cy="6858000"/>
   <p:notesSz cx="6858000" cy="9144000"/>
@@ -198,7 +200,7 @@
           <a:p>
             <a:fld id="{7FA39CCC-590F-1541-9ADD-B2E5AA3EC406}" type="datetimeFigureOut">
               <a:rPr lang="en-US" smtClean="0"/>
-              <a:t>10/22/17</a:t>
+              <a:t>4/6/19</a:t>
             </a:fld>
             <a:endParaRPr lang="en-US"/>
           </a:p>
@@ -262,38 +264,37 @@
           <a:p>
             <a:pPr lvl="0"/>
             <a:r>
-              <a:rPr lang="en-US" smtClean="0"/>
+              <a:rPr lang="en-US"/>
               <a:t>Click to edit Master text styles</a:t>
             </a:r>
           </a:p>
           <a:p>
             <a:pPr lvl="1"/>
             <a:r>
-              <a:rPr lang="en-US" smtClean="0"/>
+              <a:rPr lang="en-US"/>
               <a:t>Second level</a:t>
             </a:r>
           </a:p>
           <a:p>
             <a:pPr lvl="2"/>
             <a:r>
-              <a:rPr lang="en-US" smtClean="0"/>
+              <a:rPr lang="en-US"/>
               <a:t>Third level</a:t>
             </a:r>
           </a:p>
           <a:p>
             <a:pPr lvl="3"/>
             <a:r>
-              <a:rPr lang="en-US" smtClean="0"/>
+              <a:rPr lang="en-US"/>
               <a:t>Fourth level</a:t>
             </a:r>
           </a:p>
           <a:p>
             <a:pPr lvl="4"/>
             <a:r>
-              <a:rPr lang="en-US" smtClean="0"/>
+              <a:rPr lang="en-US"/>
               <a:t>Fifth level</a:t>
             </a:r>
-            <a:endParaRPr lang="en-US"/>
           </a:p>
         </p:txBody>
       </p:sp>
@@ -508,10 +509,9 @@
           </a:lstStyle>
           <a:p>
             <a:r>
-              <a:rPr lang="en-US" smtClean="0"/>
+              <a:rPr lang="en-US"/>
               <a:t>Click to edit Master title style</a:t>
             </a:r>
-            <a:endParaRPr lang="en-US"/>
           </a:p>
         </p:txBody>
       </p:sp>
@@ -573,10 +573,9 @@
           </a:lstStyle>
           <a:p>
             <a:r>
-              <a:rPr lang="en-US" smtClean="0"/>
+              <a:rPr lang="en-US"/>
               <a:t>Click to edit Master subtitle style</a:t>
             </a:r>
-            <a:endParaRPr lang="en-US"/>
           </a:p>
         </p:txBody>
       </p:sp>
@@ -597,7 +596,7 @@
           <a:p>
             <a:fld id="{C6511869-07AB-EF49-B84E-DA7E82FDC0D2}" type="datetimeFigureOut">
               <a:rPr lang="en-US" smtClean="0"/>
-              <a:t>10/22/17</a:t>
+              <a:t>4/6/19</a:t>
             </a:fld>
             <a:endParaRPr lang="en-US"/>
           </a:p>
@@ -691,10 +690,9 @@
           <a:lstStyle/>
           <a:p>
             <a:r>
-              <a:rPr lang="en-US" smtClean="0"/>
+              <a:rPr lang="en-US"/>
               <a:t>Click to edit Master title style</a:t>
             </a:r>
-            <a:endParaRPr lang="en-US"/>
           </a:p>
         </p:txBody>
       </p:sp>
@@ -715,38 +713,37 @@
           <a:p>
             <a:pPr lvl="0"/>
             <a:r>
-              <a:rPr lang="en-US" smtClean="0"/>
+              <a:rPr lang="en-US"/>
               <a:t>Click to edit Master text styles</a:t>
             </a:r>
           </a:p>
           <a:p>
             <a:pPr lvl="1"/>
             <a:r>
-              <a:rPr lang="en-US" smtClean="0"/>
+              <a:rPr lang="en-US"/>
               <a:t>Second level</a:t>
             </a:r>
           </a:p>
           <a:p>
             <a:pPr lvl="2"/>
             <a:r>
-              <a:rPr lang="en-US" smtClean="0"/>
+              <a:rPr lang="en-US"/>
               <a:t>Third level</a:t>
             </a:r>
           </a:p>
           <a:p>
             <a:pPr lvl="3"/>
             <a:r>
-              <a:rPr lang="en-US" smtClean="0"/>
+              <a:rPr lang="en-US"/>
               <a:t>Fourth level</a:t>
             </a:r>
           </a:p>
           <a:p>
             <a:pPr lvl="4"/>
             <a:r>
-              <a:rPr lang="en-US" smtClean="0"/>
+              <a:rPr lang="en-US"/>
               <a:t>Fifth level</a:t>
             </a:r>
-            <a:endParaRPr lang="en-US"/>
           </a:p>
         </p:txBody>
       </p:sp>
@@ -767,7 +764,7 @@
           <a:p>
             <a:fld id="{C6511869-07AB-EF49-B84E-DA7E82FDC0D2}" type="datetimeFigureOut">
               <a:rPr lang="en-US" smtClean="0"/>
-              <a:t>10/22/17</a:t>
+              <a:t>4/6/19</a:t>
             </a:fld>
             <a:endParaRPr lang="en-US"/>
           </a:p>
@@ -866,10 +863,9 @@
           <a:lstStyle/>
           <a:p>
             <a:r>
-              <a:rPr lang="en-US" smtClean="0"/>
+              <a:rPr lang="en-US"/>
               <a:t>Click to edit Master title style</a:t>
             </a:r>
-            <a:endParaRPr lang="en-US"/>
           </a:p>
         </p:txBody>
       </p:sp>
@@ -895,38 +891,37 @@
           <a:p>
             <a:pPr lvl="0"/>
             <a:r>
-              <a:rPr lang="en-US" smtClean="0"/>
+              <a:rPr lang="en-US"/>
               <a:t>Click to edit Master text styles</a:t>
             </a:r>
           </a:p>
           <a:p>
             <a:pPr lvl="1"/>
             <a:r>
-              <a:rPr lang="en-US" smtClean="0"/>
+              <a:rPr lang="en-US"/>
               <a:t>Second level</a:t>
             </a:r>
           </a:p>
           <a:p>
             <a:pPr lvl="2"/>
             <a:r>
-              <a:rPr lang="en-US" smtClean="0"/>
+              <a:rPr lang="en-US"/>
               <a:t>Third level</a:t>
             </a:r>
           </a:p>
           <a:p>
             <a:pPr lvl="3"/>
             <a:r>
-              <a:rPr lang="en-US" smtClean="0"/>
+              <a:rPr lang="en-US"/>
               <a:t>Fourth level</a:t>
             </a:r>
           </a:p>
           <a:p>
             <a:pPr lvl="4"/>
             <a:r>
-              <a:rPr lang="en-US" smtClean="0"/>
+              <a:rPr lang="en-US"/>
               <a:t>Fifth level</a:t>
             </a:r>
-            <a:endParaRPr lang="en-US"/>
           </a:p>
         </p:txBody>
       </p:sp>
@@ -947,7 +942,7 @@
           <a:p>
             <a:fld id="{C6511869-07AB-EF49-B84E-DA7E82FDC0D2}" type="datetimeFigureOut">
               <a:rPr lang="en-US" smtClean="0"/>
-              <a:t>10/22/17</a:t>
+              <a:t>4/6/19</a:t>
             </a:fld>
             <a:endParaRPr lang="en-US"/>
           </a:p>
@@ -1041,10 +1036,9 @@
           <a:lstStyle/>
           <a:p>
             <a:r>
-              <a:rPr lang="en-US" smtClean="0"/>
+              <a:rPr lang="en-US"/>
               <a:t>Click to edit Master title style</a:t>
             </a:r>
-            <a:endParaRPr lang="en-US"/>
           </a:p>
         </p:txBody>
       </p:sp>
@@ -1065,38 +1059,37 @@
           <a:p>
             <a:pPr lvl="0"/>
             <a:r>
-              <a:rPr lang="en-US" smtClean="0"/>
+              <a:rPr lang="en-US"/>
               <a:t>Click to edit Master text styles</a:t>
             </a:r>
           </a:p>
           <a:p>
             <a:pPr lvl="1"/>
             <a:r>
-              <a:rPr lang="en-US" smtClean="0"/>
+              <a:rPr lang="en-US"/>
               <a:t>Second level</a:t>
             </a:r>
           </a:p>
           <a:p>
             <a:pPr lvl="2"/>
             <a:r>
-              <a:rPr lang="en-US" smtClean="0"/>
+              <a:rPr lang="en-US"/>
               <a:t>Third level</a:t>
             </a:r>
           </a:p>
           <a:p>
             <a:pPr lvl="3"/>
             <a:r>
-              <a:rPr lang="en-US" smtClean="0"/>
+              <a:rPr lang="en-US"/>
               <a:t>Fourth level</a:t>
             </a:r>
           </a:p>
           <a:p>
             <a:pPr lvl="4"/>
             <a:r>
-              <a:rPr lang="en-US" smtClean="0"/>
+              <a:rPr lang="en-US"/>
               <a:t>Fifth level</a:t>
             </a:r>
-            <a:endParaRPr lang="en-US"/>
           </a:p>
         </p:txBody>
       </p:sp>
@@ -1117,7 +1110,7 @@
           <a:p>
             <a:fld id="{C6511869-07AB-EF49-B84E-DA7E82FDC0D2}" type="datetimeFigureOut">
               <a:rPr lang="en-US" smtClean="0"/>
-              <a:t>10/22/17</a:t>
+              <a:t>4/6/19</a:t>
             </a:fld>
             <a:endParaRPr lang="en-US"/>
           </a:p>
@@ -1220,10 +1213,9 @@
           </a:lstStyle>
           <a:p>
             <a:r>
-              <a:rPr lang="en-US" smtClean="0"/>
+              <a:rPr lang="en-US"/>
               <a:t>Click to edit Master title style</a:t>
             </a:r>
-            <a:endParaRPr lang="en-US"/>
           </a:p>
         </p:txBody>
       </p:sp>
@@ -1340,7 +1332,7 @@
           <a:p>
             <a:pPr lvl="0"/>
             <a:r>
-              <a:rPr lang="en-US" smtClean="0"/>
+              <a:rPr lang="en-US"/>
               <a:t>Click to edit Master text styles</a:t>
             </a:r>
           </a:p>
@@ -1363,7 +1355,7 @@
           <a:p>
             <a:fld id="{C6511869-07AB-EF49-B84E-DA7E82FDC0D2}" type="datetimeFigureOut">
               <a:rPr lang="en-US" smtClean="0"/>
-              <a:t>10/22/17</a:t>
+              <a:t>4/6/19</a:t>
             </a:fld>
             <a:endParaRPr lang="en-US"/>
           </a:p>
@@ -1457,10 +1449,9 @@
           <a:lstStyle/>
           <a:p>
             <a:r>
-              <a:rPr lang="en-US" smtClean="0"/>
+              <a:rPr lang="en-US"/>
               <a:t>Click to edit Master title style</a:t>
             </a:r>
-            <a:endParaRPr lang="en-US"/>
           </a:p>
         </p:txBody>
       </p:sp>
@@ -1486,38 +1477,37 @@
           <a:p>
             <a:pPr lvl="0"/>
             <a:r>
-              <a:rPr lang="en-US" smtClean="0"/>
+              <a:rPr lang="en-US"/>
               <a:t>Click to edit Master text styles</a:t>
             </a:r>
           </a:p>
           <a:p>
             <a:pPr lvl="1"/>
             <a:r>
-              <a:rPr lang="en-US" smtClean="0"/>
+              <a:rPr lang="en-US"/>
               <a:t>Second level</a:t>
             </a:r>
           </a:p>
           <a:p>
             <a:pPr lvl="2"/>
             <a:r>
-              <a:rPr lang="en-US" smtClean="0"/>
+              <a:rPr lang="en-US"/>
               <a:t>Third level</a:t>
             </a:r>
           </a:p>
           <a:p>
             <a:pPr lvl="3"/>
             <a:r>
-              <a:rPr lang="en-US" smtClean="0"/>
+              <a:rPr lang="en-US"/>
               <a:t>Fourth level</a:t>
             </a:r>
           </a:p>
           <a:p>
             <a:pPr lvl="4"/>
             <a:r>
-              <a:rPr lang="en-US" smtClean="0"/>
+              <a:rPr lang="en-US"/>
               <a:t>Fifth level</a:t>
             </a:r>
-            <a:endParaRPr lang="en-US"/>
           </a:p>
         </p:txBody>
       </p:sp>
@@ -1543,38 +1533,37 @@
           <a:p>
             <a:pPr lvl="0"/>
             <a:r>
-              <a:rPr lang="en-US" smtClean="0"/>
+              <a:rPr lang="en-US"/>
               <a:t>Click to edit Master text styles</a:t>
             </a:r>
           </a:p>
           <a:p>
             <a:pPr lvl="1"/>
             <a:r>
-              <a:rPr lang="en-US" smtClean="0"/>
+              <a:rPr lang="en-US"/>
               <a:t>Second level</a:t>
             </a:r>
           </a:p>
           <a:p>
             <a:pPr lvl="2"/>
             <a:r>
-              <a:rPr lang="en-US" smtClean="0"/>
+              <a:rPr lang="en-US"/>
               <a:t>Third level</a:t>
             </a:r>
           </a:p>
           <a:p>
             <a:pPr lvl="3"/>
             <a:r>
-              <a:rPr lang="en-US" smtClean="0"/>
+              <a:rPr lang="en-US"/>
               <a:t>Fourth level</a:t>
             </a:r>
           </a:p>
           <a:p>
             <a:pPr lvl="4"/>
             <a:r>
-              <a:rPr lang="en-US" smtClean="0"/>
+              <a:rPr lang="en-US"/>
               <a:t>Fifth level</a:t>
             </a:r>
-            <a:endParaRPr lang="en-US"/>
           </a:p>
         </p:txBody>
       </p:sp>
@@ -1595,7 +1584,7 @@
           <a:p>
             <a:fld id="{C6511869-07AB-EF49-B84E-DA7E82FDC0D2}" type="datetimeFigureOut">
               <a:rPr lang="en-US" smtClean="0"/>
-              <a:t>10/22/17</a:t>
+              <a:t>4/6/19</a:t>
             </a:fld>
             <a:endParaRPr lang="en-US"/>
           </a:p>
@@ -1694,10 +1683,9 @@
           <a:lstStyle/>
           <a:p>
             <a:r>
-              <a:rPr lang="en-US" smtClean="0"/>
+              <a:rPr lang="en-US"/>
               <a:t>Click to edit Master title style</a:t>
             </a:r>
-            <a:endParaRPr lang="en-US"/>
           </a:p>
         </p:txBody>
       </p:sp>
@@ -1760,7 +1748,7 @@
           <a:p>
             <a:pPr lvl="0"/>
             <a:r>
-              <a:rPr lang="en-US" smtClean="0"/>
+              <a:rPr lang="en-US"/>
               <a:t>Click to edit Master text styles</a:t>
             </a:r>
           </a:p>
@@ -1788,38 +1776,37 @@
           <a:p>
             <a:pPr lvl="0"/>
             <a:r>
-              <a:rPr lang="en-US" smtClean="0"/>
+              <a:rPr lang="en-US"/>
               <a:t>Click to edit Master text styles</a:t>
             </a:r>
           </a:p>
           <a:p>
             <a:pPr lvl="1"/>
             <a:r>
-              <a:rPr lang="en-US" smtClean="0"/>
+              <a:rPr lang="en-US"/>
               <a:t>Second level</a:t>
             </a:r>
           </a:p>
           <a:p>
             <a:pPr lvl="2"/>
             <a:r>
-              <a:rPr lang="en-US" smtClean="0"/>
+              <a:rPr lang="en-US"/>
               <a:t>Third level</a:t>
             </a:r>
           </a:p>
           <a:p>
             <a:pPr lvl="3"/>
             <a:r>
-              <a:rPr lang="en-US" smtClean="0"/>
+              <a:rPr lang="en-US"/>
               <a:t>Fourth level</a:t>
             </a:r>
           </a:p>
           <a:p>
             <a:pPr lvl="4"/>
             <a:r>
-              <a:rPr lang="en-US" smtClean="0"/>
+              <a:rPr lang="en-US"/>
               <a:t>Fifth level</a:t>
             </a:r>
-            <a:endParaRPr lang="en-US"/>
           </a:p>
         </p:txBody>
       </p:sp>
@@ -1882,7 +1869,7 @@
           <a:p>
             <a:pPr lvl="0"/>
             <a:r>
-              <a:rPr lang="en-US" smtClean="0"/>
+              <a:rPr lang="en-US"/>
               <a:t>Click to edit Master text styles</a:t>
             </a:r>
           </a:p>
@@ -1910,38 +1897,37 @@
           <a:p>
             <a:pPr lvl="0"/>
             <a:r>
-              <a:rPr lang="en-US" smtClean="0"/>
+              <a:rPr lang="en-US"/>
               <a:t>Click to edit Master text styles</a:t>
             </a:r>
           </a:p>
           <a:p>
             <a:pPr lvl="1"/>
             <a:r>
-              <a:rPr lang="en-US" smtClean="0"/>
+              <a:rPr lang="en-US"/>
               <a:t>Second level</a:t>
             </a:r>
           </a:p>
           <a:p>
             <a:pPr lvl="2"/>
             <a:r>
-              <a:rPr lang="en-US" smtClean="0"/>
+              <a:rPr lang="en-US"/>
               <a:t>Third level</a:t>
             </a:r>
           </a:p>
           <a:p>
             <a:pPr lvl="3"/>
             <a:r>
-              <a:rPr lang="en-US" smtClean="0"/>
+              <a:rPr lang="en-US"/>
               <a:t>Fourth level</a:t>
             </a:r>
           </a:p>
           <a:p>
             <a:pPr lvl="4"/>
             <a:r>
-              <a:rPr lang="en-US" smtClean="0"/>
+              <a:rPr lang="en-US"/>
               <a:t>Fifth level</a:t>
             </a:r>
-            <a:endParaRPr lang="en-US"/>
           </a:p>
         </p:txBody>
       </p:sp>
@@ -1962,7 +1948,7 @@
           <a:p>
             <a:fld id="{C6511869-07AB-EF49-B84E-DA7E82FDC0D2}" type="datetimeFigureOut">
               <a:rPr lang="en-US" smtClean="0"/>
-              <a:t>10/22/17</a:t>
+              <a:t>4/6/19</a:t>
             </a:fld>
             <a:endParaRPr lang="en-US"/>
           </a:p>
@@ -2056,10 +2042,9 @@
           <a:lstStyle/>
           <a:p>
             <a:r>
-              <a:rPr lang="en-US" smtClean="0"/>
+              <a:rPr lang="en-US"/>
               <a:t>Click to edit Master title style</a:t>
             </a:r>
-            <a:endParaRPr lang="en-US"/>
           </a:p>
         </p:txBody>
       </p:sp>
@@ -2080,7 +2065,7 @@
           <a:p>
             <a:fld id="{C6511869-07AB-EF49-B84E-DA7E82FDC0D2}" type="datetimeFigureOut">
               <a:rPr lang="en-US" smtClean="0"/>
-              <a:t>10/22/17</a:t>
+              <a:t>4/6/19</a:t>
             </a:fld>
             <a:endParaRPr lang="en-US"/>
           </a:p>
@@ -2175,7 +2160,7 @@
           <a:p>
             <a:fld id="{C6511869-07AB-EF49-B84E-DA7E82FDC0D2}" type="datetimeFigureOut">
               <a:rPr lang="en-US" smtClean="0"/>
-              <a:t>10/22/17</a:t>
+              <a:t>4/6/19</a:t>
             </a:fld>
             <a:endParaRPr lang="en-US"/>
           </a:p>
@@ -2278,10 +2263,9 @@
           </a:lstStyle>
           <a:p>
             <a:r>
-              <a:rPr lang="en-US" smtClean="0"/>
+              <a:rPr lang="en-US"/>
               <a:t>Click to edit Master title style</a:t>
             </a:r>
-            <a:endParaRPr lang="en-US"/>
           </a:p>
         </p:txBody>
       </p:sp>
@@ -2335,38 +2319,37 @@
           <a:p>
             <a:pPr lvl="0"/>
             <a:r>
-              <a:rPr lang="en-US" smtClean="0"/>
+              <a:rPr lang="en-US"/>
               <a:t>Click to edit Master text styles</a:t>
             </a:r>
           </a:p>
           <a:p>
             <a:pPr lvl="1"/>
             <a:r>
-              <a:rPr lang="en-US" smtClean="0"/>
+              <a:rPr lang="en-US"/>
               <a:t>Second level</a:t>
             </a:r>
           </a:p>
           <a:p>
             <a:pPr lvl="2"/>
             <a:r>
-              <a:rPr lang="en-US" smtClean="0"/>
+              <a:rPr lang="en-US"/>
               <a:t>Third level</a:t>
             </a:r>
           </a:p>
           <a:p>
             <a:pPr lvl="3"/>
             <a:r>
-              <a:rPr lang="en-US" smtClean="0"/>
+              <a:rPr lang="en-US"/>
               <a:t>Fourth level</a:t>
             </a:r>
           </a:p>
           <a:p>
             <a:pPr lvl="4"/>
             <a:r>
-              <a:rPr lang="en-US" smtClean="0"/>
+              <a:rPr lang="en-US"/>
               <a:t>Fifth level</a:t>
             </a:r>
-            <a:endParaRPr lang="en-US"/>
           </a:p>
         </p:txBody>
       </p:sp>
@@ -2429,7 +2412,7 @@
           <a:p>
             <a:pPr lvl="0"/>
             <a:r>
-              <a:rPr lang="en-US" smtClean="0"/>
+              <a:rPr lang="en-US"/>
               <a:t>Click to edit Master text styles</a:t>
             </a:r>
           </a:p>
@@ -2452,7 +2435,7 @@
           <a:p>
             <a:fld id="{C6511869-07AB-EF49-B84E-DA7E82FDC0D2}" type="datetimeFigureOut">
               <a:rPr lang="en-US" smtClean="0"/>
-              <a:t>10/22/17</a:t>
+              <a:t>4/6/19</a:t>
             </a:fld>
             <a:endParaRPr lang="en-US"/>
           </a:p>
@@ -2555,10 +2538,9 @@
           </a:lstStyle>
           <a:p>
             <a:r>
-              <a:rPr lang="en-US" smtClean="0"/>
+              <a:rPr lang="en-US"/>
               <a:t>Click to edit Master title style</a:t>
             </a:r>
-            <a:endParaRPr lang="en-US"/>
           </a:p>
         </p:txBody>
       </p:sp>
@@ -2682,7 +2664,7 @@
           <a:p>
             <a:pPr lvl="0"/>
             <a:r>
-              <a:rPr lang="en-US" smtClean="0"/>
+              <a:rPr lang="en-US"/>
               <a:t>Click to edit Master text styles</a:t>
             </a:r>
           </a:p>
@@ -2705,7 +2687,7 @@
           <a:p>
             <a:fld id="{C6511869-07AB-EF49-B84E-DA7E82FDC0D2}" type="datetimeFigureOut">
               <a:rPr lang="en-US" smtClean="0"/>
-              <a:t>10/22/17</a:t>
+              <a:t>4/6/19</a:t>
             </a:fld>
             <a:endParaRPr lang="en-US"/>
           </a:p>
@@ -2814,10 +2796,9 @@
           <a:lstStyle/>
           <a:p>
             <a:r>
-              <a:rPr lang="en-US" smtClean="0"/>
+              <a:rPr lang="en-US"/>
               <a:t>Click to edit Master title style</a:t>
             </a:r>
-            <a:endParaRPr lang="en-US"/>
           </a:p>
         </p:txBody>
       </p:sp>
@@ -2848,38 +2829,37 @@
           <a:p>
             <a:pPr lvl="0"/>
             <a:r>
-              <a:rPr lang="en-US" smtClean="0"/>
+              <a:rPr lang="en-US"/>
               <a:t>Click to edit Master text styles</a:t>
             </a:r>
           </a:p>
           <a:p>
             <a:pPr lvl="1"/>
             <a:r>
-              <a:rPr lang="en-US" smtClean="0"/>
+              <a:rPr lang="en-US"/>
               <a:t>Second level</a:t>
             </a:r>
           </a:p>
           <a:p>
             <a:pPr lvl="2"/>
             <a:r>
-              <a:rPr lang="en-US" smtClean="0"/>
+              <a:rPr lang="en-US"/>
               <a:t>Third level</a:t>
             </a:r>
           </a:p>
           <a:p>
             <a:pPr lvl="3"/>
             <a:r>
-              <a:rPr lang="en-US" smtClean="0"/>
+              <a:rPr lang="en-US"/>
               <a:t>Fourth level</a:t>
             </a:r>
           </a:p>
           <a:p>
             <a:pPr lvl="4"/>
             <a:r>
-              <a:rPr lang="en-US" smtClean="0"/>
+              <a:rPr lang="en-US"/>
               <a:t>Fifth level</a:t>
             </a:r>
-            <a:endParaRPr lang="en-US"/>
           </a:p>
         </p:txBody>
       </p:sp>
@@ -2918,7 +2898,7 @@
           <a:p>
             <a:fld id="{C6511869-07AB-EF49-B84E-DA7E82FDC0D2}" type="datetimeFigureOut">
               <a:rPr lang="en-US" smtClean="0"/>
-              <a:t>10/22/17</a:t>
+              <a:t>4/6/19</a:t>
             </a:fld>
             <a:endParaRPr lang="en-US"/>
           </a:p>
@@ -8317,6 +8297,246 @@
     <p:extLst>
       <p:ext uri="{BB962C8B-B14F-4D97-AF65-F5344CB8AC3E}">
         <p14:creationId xmlns:p14="http://schemas.microsoft.com/office/powerpoint/2010/main" val="519538664"/>
+      </p:ext>
+    </p:extLst>
+  </p:cSld>
+  <p:clrMapOvr>
+    <a:masterClrMapping/>
+  </p:clrMapOvr>
+</p:sld>
+</file>
+
+<file path=ppt/slides/slide3.xml><?xml version="1.0" encoding="utf-8"?>
+<p:sld xmlns:a="http://schemas.openxmlformats.org/drawingml/2006/main" xmlns:r="http://schemas.openxmlformats.org/officeDocument/2006/relationships" xmlns:p="http://schemas.openxmlformats.org/presentationml/2006/main">
+  <p:cSld>
+    <p:spTree>
+      <p:nvGrpSpPr>
+        <p:cNvPr id="1" name=""/>
+        <p:cNvGrpSpPr/>
+        <p:nvPr/>
+      </p:nvGrpSpPr>
+      <p:grpSpPr>
+        <a:xfrm>
+          <a:off x="0" y="0"/>
+          <a:ext cx="0" cy="0"/>
+          <a:chOff x="0" y="0"/>
+          <a:chExt cx="0" cy="0"/>
+        </a:xfrm>
+      </p:grpSpPr>
+      <p:pic>
+        <p:nvPicPr>
+          <p:cNvPr id="5" name="Picture 4">
+            <a:extLst>
+              <a:ext uri="{FF2B5EF4-FFF2-40B4-BE49-F238E27FC236}">
+                <a16:creationId xmlns:a16="http://schemas.microsoft.com/office/drawing/2014/main" id="{093C6CC2-0817-584C-838E-DE40C9B0099B}"/>
+              </a:ext>
+            </a:extLst>
+          </p:cNvPr>
+          <p:cNvPicPr>
+            <a:picLocks noChangeAspect="1"/>
+          </p:cNvPicPr>
+          <p:nvPr/>
+        </p:nvPicPr>
+        <p:blipFill>
+          <a:blip r:embed="rId2"/>
+          <a:stretch>
+            <a:fillRect/>
+          </a:stretch>
+        </p:blipFill>
+        <p:spPr>
+          <a:xfrm>
+            <a:off x="1200377" y="339811"/>
+            <a:ext cx="3314700" cy="3225800"/>
+          </a:xfrm>
+          <a:prstGeom prst="rect">
+            <a:avLst/>
+          </a:prstGeom>
+        </p:spPr>
+      </p:pic>
+      <p:pic>
+        <p:nvPicPr>
+          <p:cNvPr id="7" name="Picture 6">
+            <a:extLst>
+              <a:ext uri="{FF2B5EF4-FFF2-40B4-BE49-F238E27FC236}">
+                <a16:creationId xmlns:a16="http://schemas.microsoft.com/office/drawing/2014/main" id="{E1E01004-7A7D-B242-8A77-60DE087397CB}"/>
+              </a:ext>
+            </a:extLst>
+          </p:cNvPr>
+          <p:cNvPicPr>
+            <a:picLocks noChangeAspect="1"/>
+          </p:cNvPicPr>
+          <p:nvPr/>
+        </p:nvPicPr>
+        <p:blipFill>
+          <a:blip r:embed="rId3"/>
+          <a:stretch>
+            <a:fillRect/>
+          </a:stretch>
+        </p:blipFill>
+        <p:spPr>
+          <a:xfrm>
+            <a:off x="1251177" y="3784831"/>
+            <a:ext cx="3213100" cy="2603500"/>
+          </a:xfrm>
+          <a:prstGeom prst="rect">
+            <a:avLst/>
+          </a:prstGeom>
+        </p:spPr>
+      </p:pic>
+      <p:pic>
+        <p:nvPicPr>
+          <p:cNvPr id="12" name="Picture 11">
+            <a:extLst>
+              <a:ext uri="{FF2B5EF4-FFF2-40B4-BE49-F238E27FC236}">
+                <a16:creationId xmlns:a16="http://schemas.microsoft.com/office/drawing/2014/main" id="{C088CB1A-9EC8-4D45-A704-26ADFAE5EBD6}"/>
+              </a:ext>
+            </a:extLst>
+          </p:cNvPr>
+          <p:cNvPicPr>
+            <a:picLocks noChangeAspect="1"/>
+          </p:cNvPicPr>
+          <p:nvPr/>
+        </p:nvPicPr>
+        <p:blipFill>
+          <a:blip r:embed="rId4"/>
+          <a:stretch>
+            <a:fillRect/>
+          </a:stretch>
+        </p:blipFill>
+        <p:spPr>
+          <a:xfrm>
+            <a:off x="7931722" y="435803"/>
+            <a:ext cx="3580514" cy="5986393"/>
+          </a:xfrm>
+          <a:prstGeom prst="rect">
+            <a:avLst/>
+          </a:prstGeom>
+        </p:spPr>
+      </p:pic>
+    </p:spTree>
+    <p:extLst>
+      <p:ext uri="{BB962C8B-B14F-4D97-AF65-F5344CB8AC3E}">
+        <p14:creationId xmlns:p14="http://schemas.microsoft.com/office/powerpoint/2010/main" val="3055270654"/>
+      </p:ext>
+    </p:extLst>
+  </p:cSld>
+  <p:clrMapOvr>
+    <a:masterClrMapping/>
+  </p:clrMapOvr>
+</p:sld>
+</file>
+
+<file path=ppt/slides/slide4.xml><?xml version="1.0" encoding="utf-8"?>
+<p:sld xmlns:a="http://schemas.openxmlformats.org/drawingml/2006/main" xmlns:r="http://schemas.openxmlformats.org/officeDocument/2006/relationships" xmlns:p="http://schemas.openxmlformats.org/presentationml/2006/main">
+  <p:cSld>
+    <p:spTree>
+      <p:nvGrpSpPr>
+        <p:cNvPr id="1" name=""/>
+        <p:cNvGrpSpPr/>
+        <p:nvPr/>
+      </p:nvGrpSpPr>
+      <p:grpSpPr>
+        <a:xfrm>
+          <a:off x="0" y="0"/>
+          <a:ext cx="0" cy="0"/>
+          <a:chOff x="0" y="0"/>
+          <a:chExt cx="0" cy="0"/>
+        </a:xfrm>
+      </p:grpSpPr>
+      <p:pic>
+        <p:nvPicPr>
+          <p:cNvPr id="5" name="Picture 4">
+            <a:extLst>
+              <a:ext uri="{FF2B5EF4-FFF2-40B4-BE49-F238E27FC236}">
+                <a16:creationId xmlns:a16="http://schemas.microsoft.com/office/drawing/2014/main" id="{FC1BAE6F-F675-D545-950A-980B227A768A}"/>
+              </a:ext>
+            </a:extLst>
+          </p:cNvPr>
+          <p:cNvPicPr>
+            <a:picLocks noChangeAspect="1"/>
+          </p:cNvPicPr>
+          <p:nvPr/>
+        </p:nvPicPr>
+        <p:blipFill>
+          <a:blip r:embed="rId2"/>
+          <a:stretch>
+            <a:fillRect/>
+          </a:stretch>
+        </p:blipFill>
+        <p:spPr>
+          <a:xfrm>
+            <a:off x="4182788" y="658224"/>
+            <a:ext cx="2317928" cy="3982081"/>
+          </a:xfrm>
+          <a:prstGeom prst="rect">
+            <a:avLst/>
+          </a:prstGeom>
+        </p:spPr>
+      </p:pic>
+      <p:pic>
+        <p:nvPicPr>
+          <p:cNvPr id="8" name="Picture 7">
+            <a:extLst>
+              <a:ext uri="{FF2B5EF4-FFF2-40B4-BE49-F238E27FC236}">
+                <a16:creationId xmlns:a16="http://schemas.microsoft.com/office/drawing/2014/main" id="{8A62A134-F9D4-6742-B3AD-F6E6F5D22A06}"/>
+              </a:ext>
+            </a:extLst>
+          </p:cNvPr>
+          <p:cNvPicPr>
+            <a:picLocks noChangeAspect="1"/>
+          </p:cNvPicPr>
+          <p:nvPr/>
+        </p:nvPicPr>
+        <p:blipFill>
+          <a:blip r:embed="rId3"/>
+          <a:stretch>
+            <a:fillRect/>
+          </a:stretch>
+        </p:blipFill>
+        <p:spPr>
+          <a:xfrm>
+            <a:off x="488745" y="658224"/>
+            <a:ext cx="3694043" cy="2993197"/>
+          </a:xfrm>
+          <a:prstGeom prst="rect">
+            <a:avLst/>
+          </a:prstGeom>
+        </p:spPr>
+      </p:pic>
+      <p:pic>
+        <p:nvPicPr>
+          <p:cNvPr id="9" name="Picture 8">
+            <a:extLst>
+              <a:ext uri="{FF2B5EF4-FFF2-40B4-BE49-F238E27FC236}">
+                <a16:creationId xmlns:a16="http://schemas.microsoft.com/office/drawing/2014/main" id="{36B7CE8D-833D-DA44-9393-D86DF9EB2407}"/>
+              </a:ext>
+            </a:extLst>
+          </p:cNvPr>
+          <p:cNvPicPr>
+            <a:picLocks noChangeAspect="1"/>
+          </p:cNvPicPr>
+          <p:nvPr/>
+        </p:nvPicPr>
+        <p:blipFill>
+          <a:blip r:embed="rId4"/>
+          <a:stretch>
+            <a:fillRect/>
+          </a:stretch>
+        </p:blipFill>
+        <p:spPr>
+          <a:xfrm>
+            <a:off x="6500716" y="244881"/>
+            <a:ext cx="4641728" cy="4517237"/>
+          </a:xfrm>
+          <a:prstGeom prst="rect">
+            <a:avLst/>
+          </a:prstGeom>
+        </p:spPr>
+      </p:pic>
+    </p:spTree>
+    <p:extLst>
+      <p:ext uri="{BB962C8B-B14F-4D97-AF65-F5344CB8AC3E}">
+        <p14:creationId xmlns:p14="http://schemas.microsoft.com/office/powerpoint/2010/main" val="2855533484"/>
       </p:ext>
     </p:extLst>
   </p:cSld>

</xml_diff>